<commit_message>
correction to styling in powerpoint presentation
</commit_message>
<xml_diff>
--- a/docs/NYPD Arrest Project.pptx
+++ b/docs/NYPD Arrest Project.pptx
@@ -1363,7 +1363,7 @@
         </p:nvSpPr>
         <p:spPr>
           <a:xfrm>
-            <a:off x="381300" y="685800"/>
+            <a:off x="381000" y="685800"/>
             <a:ext cx="6096000" cy="3429000"/>
           </a:xfrm>
           <a:custGeom>
@@ -1467,7 +1467,7 @@
         </p:nvSpPr>
         <p:spPr>
           <a:xfrm>
-            <a:off x="381300" y="685800"/>
+            <a:off x="381000" y="685800"/>
             <a:ext cx="6096000" cy="3429000"/>
           </a:xfrm>
           <a:custGeom>
@@ -8125,7 +8125,7 @@
               </a:spcAft>
               <a:buNone/>
             </a:pPr>
-            <a:endParaRPr sz="1600">
+            <a:endParaRPr sz="1600" dirty="0">
               <a:solidFill>
                 <a:schemeClr val="dk1"/>
               </a:solidFill>
@@ -8157,7 +8157,7 @@
               <a:buChar char="●"/>
             </a:pPr>
             <a:r>
-              <a:rPr lang="en" sz="1600">
+              <a:rPr lang="en" sz="1600" dirty="0">
                 <a:solidFill>
                   <a:schemeClr val="dk1"/>
                 </a:solidFill>
@@ -8171,7 +8171,7 @@
               </a:rPr>
               <a:t>        'ARREST_KEY' - unique ID for each arrest record</a:t>
             </a:r>
-            <a:endParaRPr sz="1600">
+            <a:endParaRPr sz="1600" dirty="0">
               <a:solidFill>
                 <a:schemeClr val="dk1"/>
               </a:solidFill>
@@ -8203,7 +8203,7 @@
               <a:buChar char="●"/>
             </a:pPr>
             <a:r>
-              <a:rPr lang="en" sz="1600">
+              <a:rPr lang="en" sz="1600" dirty="0">
                 <a:solidFill>
                   <a:schemeClr val="dk1"/>
                 </a:solidFill>
@@ -8217,7 +8217,7 @@
               </a:rPr>
               <a:t>        'PD_CD' - three digit classification code (more granular than KY_CD)</a:t>
             </a:r>
-            <a:endParaRPr sz="1600">
+            <a:endParaRPr sz="1600" dirty="0">
               <a:solidFill>
                 <a:schemeClr val="dk1"/>
               </a:solidFill>
@@ -8249,7 +8249,7 @@
               <a:buChar char="●"/>
             </a:pPr>
             <a:r>
-              <a:rPr lang="en" sz="1600">
+              <a:rPr lang="en" sz="1600" dirty="0">
                 <a:solidFill>
                   <a:schemeClr val="dk1"/>
                 </a:solidFill>
@@ -8263,7 +8263,7 @@
               </a:rPr>
               <a:t>        'KY_CD' - three digit classification code (more general than PD_CD)</a:t>
             </a:r>
-            <a:endParaRPr sz="1600">
+            <a:endParaRPr sz="1600" dirty="0">
               <a:solidFill>
                 <a:schemeClr val="dk1"/>
               </a:solidFill>
@@ -8295,7 +8295,7 @@
               <a:buChar char="●"/>
             </a:pPr>
             <a:r>
-              <a:rPr lang="en" sz="1600">
+              <a:rPr lang="en" sz="1600" dirty="0">
                 <a:solidFill>
                   <a:schemeClr val="dk1"/>
                 </a:solidFill>
@@ -8309,7 +8309,7 @@
               </a:rPr>
               <a:t>    ‘OFNS_DESC' - description of internal classification corresponding to KY code (more general than PD_DESC)</a:t>
             </a:r>
-            <a:endParaRPr sz="1600">
+            <a:endParaRPr sz="1600" dirty="0">
               <a:solidFill>
                 <a:schemeClr val="dk1"/>
               </a:solidFill>
@@ -8341,7 +8341,7 @@
               <a:buChar char="●"/>
             </a:pPr>
             <a:r>
-              <a:rPr lang="en" sz="1600">
+              <a:rPr lang="en" sz="1600" dirty="0">
                 <a:solidFill>
                   <a:schemeClr val="dk1"/>
                 </a:solidFill>
@@ -8355,7 +8355,7 @@
               </a:rPr>
               <a:t>        'LAW_CODE' - charges corresponding to penal law, and local law</a:t>
             </a:r>
-            <a:endParaRPr sz="1600">
+            <a:endParaRPr sz="1600" dirty="0">
               <a:solidFill>
                 <a:schemeClr val="dk1"/>
               </a:solidFill>
@@ -8387,7 +8387,7 @@
               <a:buChar char="●"/>
             </a:pPr>
             <a:r>
-              <a:rPr lang="en" sz="1600">
+              <a:rPr lang="en" sz="1600" dirty="0">
                 <a:solidFill>
                   <a:schemeClr val="dk1"/>
                 </a:solidFill>
@@ -8401,7 +8401,7 @@
               </a:rPr>
               <a:t>        'ARREST_PRECINT’ - precinct where the arrest occurred</a:t>
             </a:r>
-            <a:endParaRPr sz="1600">
+            <a:endParaRPr sz="1600" dirty="0">
               <a:solidFill>
                 <a:schemeClr val="dk1"/>
               </a:solidFill>
@@ -8433,7 +8433,7 @@
               <a:buChar char="●"/>
             </a:pPr>
             <a:r>
-              <a:rPr lang="en" sz="1600">
+              <a:rPr lang="en" sz="1600" dirty="0">
                 <a:solidFill>
                   <a:schemeClr val="dk1"/>
                 </a:solidFill>
@@ -8447,7 +8447,7 @@
               </a:rPr>
               <a:t>        'JURISDICTION_CODE’ - jurisdiction responsible for arrest.</a:t>
             </a:r>
-            <a:endParaRPr sz="1600">
+            <a:endParaRPr sz="1600" dirty="0">
               <a:solidFill>
                 <a:schemeClr val="dk1"/>
               </a:solidFill>
@@ -8478,7 +8478,7 @@
               <a:buFont typeface="Arial"/>
               <a:buNone/>
             </a:pPr>
-            <a:endParaRPr sz="1600">
+            <a:endParaRPr sz="1600" dirty="0">
               <a:solidFill>
                 <a:schemeClr val="dk1"/>
               </a:solidFill>
@@ -8501,7 +8501,7 @@
               </a:spcAft>
               <a:buNone/>
             </a:pPr>
-            <a:endParaRPr sz="1600">
+            <a:endParaRPr sz="1600" dirty="0">
               <a:latin typeface="Calibri"/>
               <a:ea typeface="Calibri"/>
               <a:cs typeface="Calibri"/>
@@ -8839,20 +8839,20 @@
               <a:buNone/>
             </a:pPr>
             <a:r>
-              <a:rPr lang="en" sz="3466" b="1">
+              <a:rPr lang="en" sz="3466" b="1" dirty="0">
                 <a:latin typeface="Calibri"/>
                 <a:ea typeface="Calibri"/>
                 <a:cs typeface="Calibri"/>
                 <a:sym typeface="Calibri"/>
               </a:rPr>
-              <a:t>                      Investigative Questions </a:t>
+              <a:t>                      Investigative Questions       </a:t>
             </a:r>
             <a:r>
-              <a:rPr lang="en"/>
-              <a:t>			 </a:t>
+              <a:rPr lang="en" dirty="0"/>
+              <a:t>	 </a:t>
             </a:r>
             <a:r>
-              <a:rPr lang="en" sz="1800" b="1">
+              <a:rPr lang="en" sz="1800" b="1" dirty="0">
                 <a:latin typeface="Calibri"/>
                 <a:ea typeface="Calibri"/>
                 <a:cs typeface="Calibri"/>
@@ -8860,7 +8860,7 @@
               </a:rPr>
               <a:t>-T1 Olivia</a:t>
             </a:r>
-            <a:endParaRPr sz="1800" b="1">
+            <a:endParaRPr sz="1800" b="1" dirty="0">
               <a:latin typeface="Calibri"/>
               <a:ea typeface="Calibri"/>
               <a:cs typeface="Calibri"/>
@@ -8909,7 +8909,7 @@
               <a:buAutoNum type="arabicPeriod"/>
             </a:pPr>
             <a:r>
-              <a:rPr lang="en" sz="2152" b="1">
+              <a:rPr lang="en" sz="2152" b="1" dirty="0">
                 <a:solidFill>
                   <a:schemeClr val="dk1"/>
                 </a:solidFill>
@@ -8920,7 +8920,7 @@
               </a:rPr>
               <a:t>most_arrests_day_most_common_race():</a:t>
             </a:r>
-            <a:endParaRPr sz="2152" b="1">
+            <a:endParaRPr sz="2152" b="1" dirty="0">
               <a:solidFill>
                 <a:schemeClr val="dk1"/>
               </a:solidFill>
@@ -8946,7 +8946,7 @@
               <a:buChar char="○"/>
             </a:pPr>
             <a:r>
-              <a:rPr lang="en" sz="1842">
+              <a:rPr lang="en" sz="1842" dirty="0">
                 <a:solidFill>
                   <a:schemeClr val="dk1"/>
                 </a:solidFill>
@@ -8957,7 +8957,7 @@
               </a:rPr>
               <a:t>Which day of the year had the highest number of arrests and what was the most common race of the perpetrators on that day? </a:t>
             </a:r>
-            <a:endParaRPr sz="1842">
+            <a:endParaRPr sz="1842" dirty="0">
               <a:solidFill>
                 <a:schemeClr val="dk1"/>
               </a:solidFill>
@@ -8978,7 +8978,7 @@
               <a:buNone/>
             </a:pPr>
             <a:r>
-              <a:rPr lang="en" sz="1842">
+              <a:rPr lang="en" sz="1842" dirty="0">
                 <a:solidFill>
                   <a:schemeClr val="dk1"/>
                 </a:solidFill>
@@ -8989,7 +8989,7 @@
               </a:rPr>
               <a:t>Attributes used for method:</a:t>
             </a:r>
-            <a:endParaRPr sz="1842">
+            <a:endParaRPr sz="1842" dirty="0">
               <a:solidFill>
                 <a:schemeClr val="dk1"/>
               </a:solidFill>
@@ -9015,7 +9015,7 @@
               <a:buChar char="○"/>
             </a:pPr>
             <a:r>
-              <a:rPr lang="en" sz="1842">
+              <a:rPr lang="en" sz="1842" dirty="0">
                 <a:solidFill>
                   <a:schemeClr val="dk1"/>
                 </a:solidFill>
@@ -9026,7 +9026,7 @@
               </a:rPr>
               <a:t>ARREST_DATE</a:t>
             </a:r>
-            <a:endParaRPr sz="1842">
+            <a:endParaRPr sz="1842" dirty="0">
               <a:solidFill>
                 <a:schemeClr val="dk1"/>
               </a:solidFill>
@@ -9052,7 +9052,7 @@
               <a:buChar char="○"/>
             </a:pPr>
             <a:r>
-              <a:rPr lang="en" sz="1842">
+              <a:rPr lang="en" sz="1842" dirty="0">
                 <a:solidFill>
                   <a:schemeClr val="dk1"/>
                 </a:solidFill>
@@ -9063,7 +9063,7 @@
               </a:rPr>
               <a:t>PERP_RACE</a:t>
             </a:r>
-            <a:endParaRPr sz="1842">
+            <a:endParaRPr sz="1842" dirty="0">
               <a:solidFill>
                 <a:schemeClr val="dk1"/>
               </a:solidFill>
@@ -9083,7 +9083,7 @@
               </a:spcAft>
               <a:buNone/>
             </a:pPr>
-            <a:endParaRPr sz="1842">
+            <a:endParaRPr sz="1842" dirty="0">
               <a:solidFill>
                 <a:schemeClr val="dk1"/>
               </a:solidFill>
@@ -9094,7 +9094,7 @@
             </a:endParaRPr>
           </a:p>
           <a:p>
-            <a:pPr marL="457200" lvl="0" indent="-324298" algn="l" rtl="0">
+            <a:pPr marL="132902" lvl="0" indent="0" algn="l" rtl="0">
               <a:spcBef>
                 <a:spcPts val="1200"/>
               </a:spcBef>
@@ -9105,11 +9105,10 @@
                 <a:schemeClr val="dk1"/>
               </a:buClr>
               <a:buSzPct val="100000"/>
-              <a:buFont typeface="Calibri"/>
-              <a:buAutoNum type="arabicPeriod"/>
+              <a:buNone/>
             </a:pPr>
             <a:r>
-              <a:rPr lang="en" sz="2152" b="1">
+              <a:rPr lang="en" sz="2152" b="1" dirty="0">
                 <a:solidFill>
                   <a:schemeClr val="dk1"/>
                 </a:solidFill>
@@ -9118,9 +9117,9 @@
                 <a:cs typeface="Calibri"/>
                 <a:sym typeface="Calibri"/>
               </a:rPr>
-              <a:t>highest_felony_offense_in_borough():</a:t>
+              <a:t>2.    highest_felony_offense_in_borough():</a:t>
             </a:r>
-            <a:endParaRPr sz="2152" b="1">
+            <a:endParaRPr sz="2152" b="1" dirty="0">
               <a:solidFill>
                 <a:schemeClr val="dk1"/>
               </a:solidFill>
@@ -9146,7 +9145,7 @@
               <a:buChar char="○"/>
             </a:pPr>
             <a:r>
-              <a:rPr lang="en" sz="1800">
+              <a:rPr lang="en" sz="1800" dirty="0">
                 <a:solidFill>
                   <a:schemeClr val="dk1"/>
                 </a:solidFill>
@@ -9157,7 +9156,7 @@
               </a:rPr>
               <a:t>Which borough had the highest number of arrests for felony offenses and therefore what felony offense was most committed in that borough? </a:t>
             </a:r>
-            <a:endParaRPr sz="1800">
+            <a:endParaRPr sz="1800" dirty="0">
               <a:solidFill>
                 <a:schemeClr val="dk1"/>
               </a:solidFill>
@@ -9178,7 +9177,7 @@
               <a:buNone/>
             </a:pPr>
             <a:r>
-              <a:rPr lang="en">
+              <a:rPr lang="en" dirty="0">
                 <a:solidFill>
                   <a:schemeClr val="dk1"/>
                 </a:solidFill>
@@ -9189,7 +9188,7 @@
               </a:rPr>
               <a:t>Attributes used for method:</a:t>
             </a:r>
-            <a:endParaRPr>
+            <a:endParaRPr dirty="0">
               <a:solidFill>
                 <a:schemeClr val="dk1"/>
               </a:solidFill>
@@ -9215,7 +9214,7 @@
               <a:buChar char="○"/>
             </a:pPr>
             <a:r>
-              <a:rPr lang="en" sz="1800">
+              <a:rPr lang="en" sz="1800" dirty="0">
                 <a:solidFill>
                   <a:schemeClr val="dk1"/>
                 </a:solidFill>
@@ -9226,7 +9225,7 @@
               </a:rPr>
               <a:t>ARREST_BORO</a:t>
             </a:r>
-            <a:endParaRPr sz="1800">
+            <a:endParaRPr sz="1800" dirty="0">
               <a:solidFill>
                 <a:schemeClr val="dk1"/>
               </a:solidFill>
@@ -9252,7 +9251,7 @@
               <a:buChar char="○"/>
             </a:pPr>
             <a:r>
-              <a:rPr lang="en" sz="1800">
+              <a:rPr lang="en" sz="1800" dirty="0">
                 <a:solidFill>
                   <a:schemeClr val="dk1"/>
                 </a:solidFill>
@@ -9263,7 +9262,7 @@
               </a:rPr>
               <a:t>LAW_CAT_CD</a:t>
             </a:r>
-            <a:endParaRPr sz="1800">
+            <a:endParaRPr sz="1800" dirty="0">
               <a:solidFill>
                 <a:schemeClr val="dk1"/>
               </a:solidFill>
@@ -9289,7 +9288,7 @@
               <a:buChar char="○"/>
             </a:pPr>
             <a:r>
-              <a:rPr lang="en" sz="1800">
+              <a:rPr lang="en" sz="1800" dirty="0">
                 <a:solidFill>
                   <a:schemeClr val="dk1"/>
                 </a:solidFill>
@@ -9300,7 +9299,7 @@
               </a:rPr>
               <a:t>PD_DESC</a:t>
             </a:r>
-            <a:endParaRPr sz="1800">
+            <a:endParaRPr sz="1800" dirty="0">
               <a:solidFill>
                 <a:schemeClr val="dk1"/>
               </a:solidFill>
@@ -9372,7 +9371,7 @@
               <a:buNone/>
             </a:pPr>
             <a:r>
-              <a:rPr lang="en" sz="3355" b="1">
+              <a:rPr lang="en" sz="3355" b="1" dirty="0">
                 <a:latin typeface="Calibri"/>
                 <a:ea typeface="Calibri"/>
                 <a:cs typeface="Calibri"/>
@@ -9381,11 +9380,11 @@
               <a:t>                             Investigative Questions </a:t>
             </a:r>
             <a:r>
-              <a:rPr lang="en"/>
-              <a:t>			</a:t>
+              <a:rPr lang="en" dirty="0"/>
+              <a:t>		</a:t>
             </a:r>
             <a:r>
-              <a:rPr lang="en" sz="1800" b="1">
+              <a:rPr lang="en" sz="1800" b="1" dirty="0">
                 <a:latin typeface="Calibri"/>
                 <a:ea typeface="Calibri"/>
                 <a:cs typeface="Calibri"/>
@@ -9393,7 +9392,7 @@
               </a:rPr>
               <a:t>-T2 Swathi</a:t>
             </a:r>
-            <a:endParaRPr sz="1800" b="1">
+            <a:endParaRPr sz="1800" b="1" dirty="0">
               <a:latin typeface="Calibri"/>
               <a:ea typeface="Calibri"/>
               <a:cs typeface="Calibri"/>
@@ -9442,7 +9441,7 @@
               <a:buAutoNum type="arabicPeriod"/>
             </a:pPr>
             <a:r>
-              <a:rPr lang="en" sz="3224" b="1">
+              <a:rPr lang="en" sz="3224" b="1" dirty="0">
                 <a:solidFill>
                   <a:schemeClr val="dk1"/>
                 </a:solidFill>
@@ -9453,7 +9452,7 @@
               </a:rPr>
               <a:t>crime_most_committed_agegroup(crime_type):</a:t>
             </a:r>
-            <a:endParaRPr sz="3224" b="1">
+            <a:endParaRPr sz="3224" b="1" dirty="0">
               <a:solidFill>
                 <a:schemeClr val="dk1"/>
               </a:solidFill>
@@ -9479,7 +9478,7 @@
               <a:buChar char="○"/>
             </a:pPr>
             <a:r>
-              <a:rPr lang="en" sz="2652">
+              <a:rPr lang="en" sz="2652" dirty="0">
                 <a:solidFill>
                   <a:schemeClr val="dk1"/>
                 </a:solidFill>
@@ -9490,7 +9489,7 @@
               </a:rPr>
               <a:t>Which age group(s) has committed given crime the most, and what is the ratio of crime committed between Male and Female? </a:t>
             </a:r>
-            <a:endParaRPr sz="2652">
+            <a:endParaRPr sz="2652" dirty="0">
               <a:solidFill>
                 <a:schemeClr val="dk1"/>
               </a:solidFill>
@@ -9516,7 +9515,7 @@
               <a:buNone/>
             </a:pPr>
             <a:r>
-              <a:rPr lang="en" sz="2652">
+              <a:rPr lang="en" sz="2652" dirty="0">
                 <a:solidFill>
                   <a:schemeClr val="dk1"/>
                 </a:solidFill>
@@ -9527,7 +9526,7 @@
               </a:rPr>
               <a:t>Attributes used for method:</a:t>
             </a:r>
-            <a:endParaRPr sz="2652">
+            <a:endParaRPr sz="2652" dirty="0">
               <a:solidFill>
                 <a:schemeClr val="dk1"/>
               </a:solidFill>
@@ -9553,7 +9552,7 @@
               <a:buChar char="○"/>
             </a:pPr>
             <a:r>
-              <a:rPr lang="en" sz="2652">
+              <a:rPr lang="en" sz="2652" dirty="0">
                 <a:solidFill>
                   <a:schemeClr val="dk1"/>
                 </a:solidFill>
@@ -9564,7 +9563,7 @@
               </a:rPr>
               <a:t>PD_DESC</a:t>
             </a:r>
-            <a:endParaRPr sz="2652">
+            <a:endParaRPr sz="2652" dirty="0">
               <a:solidFill>
                 <a:schemeClr val="dk1"/>
               </a:solidFill>
@@ -9590,7 +9589,7 @@
               <a:buChar char="○"/>
             </a:pPr>
             <a:r>
-              <a:rPr lang="en" sz="2652">
+              <a:rPr lang="en" sz="2652" dirty="0">
                 <a:solidFill>
                   <a:schemeClr val="dk1"/>
                 </a:solidFill>
@@ -9601,7 +9600,7 @@
               </a:rPr>
               <a:t>AGE_GROUP</a:t>
             </a:r>
-            <a:endParaRPr sz="2652">
+            <a:endParaRPr sz="2652" dirty="0">
               <a:solidFill>
                 <a:schemeClr val="dk1"/>
               </a:solidFill>
@@ -9627,7 +9626,7 @@
               <a:buChar char="○"/>
             </a:pPr>
             <a:r>
-              <a:rPr lang="en" sz="2652">
+              <a:rPr lang="en" sz="2652" dirty="0">
                 <a:solidFill>
                   <a:schemeClr val="dk1"/>
                 </a:solidFill>
@@ -9638,7 +9637,7 @@
               </a:rPr>
               <a:t>PERP_SEX</a:t>
             </a:r>
-            <a:endParaRPr sz="2652">
+            <a:endParaRPr sz="2652" dirty="0">
               <a:solidFill>
                 <a:schemeClr val="dk1"/>
               </a:solidFill>
@@ -9663,14 +9662,14 @@
               <a:buFont typeface="Arial"/>
               <a:buNone/>
             </a:pPr>
-            <a:endParaRPr>
+            <a:endParaRPr dirty="0">
               <a:solidFill>
                 <a:schemeClr val="dk1"/>
               </a:solidFill>
             </a:endParaRPr>
           </a:p>
           <a:p>
-            <a:pPr marL="457200" lvl="0" indent="-325864" algn="l" rtl="0">
+            <a:pPr marL="131336" lvl="0" indent="0" algn="l" rtl="0">
               <a:spcBef>
                 <a:spcPts val="1200"/>
               </a:spcBef>
@@ -9681,11 +9680,10 @@
                 <a:schemeClr val="dk1"/>
               </a:buClr>
               <a:buSzPct val="100000"/>
-              <a:buFont typeface="Calibri"/>
-              <a:buAutoNum type="arabicPeriod"/>
+              <a:buNone/>
             </a:pPr>
             <a:r>
-              <a:rPr lang="en" sz="3224" b="1">
+              <a:rPr lang="en" sz="3224" b="1" dirty="0">
                 <a:solidFill>
                   <a:schemeClr val="dk1"/>
                 </a:solidFill>
@@ -9694,9 +9692,9 @@
                 <a:cs typeface="Calibri"/>
                 <a:sym typeface="Calibri"/>
               </a:rPr>
-              <a:t>avg_time_diff_between_arrests(crime_type):</a:t>
+              <a:t>2.     avg_time_diff_between_arrests(crime_type):</a:t>
             </a:r>
-            <a:endParaRPr sz="3224" b="1">
+            <a:endParaRPr sz="3224" b="1" dirty="0">
               <a:solidFill>
                 <a:schemeClr val="dk1"/>
               </a:solidFill>
@@ -9722,7 +9720,7 @@
               <a:buChar char="○"/>
             </a:pPr>
             <a:r>
-              <a:rPr lang="en" sz="2724">
+              <a:rPr lang="en" sz="2724" dirty="0">
                 <a:solidFill>
                   <a:schemeClr val="dk1"/>
                 </a:solidFill>
@@ -9733,7 +9731,7 @@
               </a:rPr>
               <a:t>What is the average time difference between arrests for a crime type according to the age group for each borough? </a:t>
             </a:r>
-            <a:endParaRPr sz="2724">
+            <a:endParaRPr sz="2724" dirty="0">
               <a:solidFill>
                 <a:schemeClr val="dk1"/>
               </a:solidFill>
@@ -9759,7 +9757,7 @@
               <a:buNone/>
             </a:pPr>
             <a:r>
-              <a:rPr lang="en" sz="2724">
+              <a:rPr lang="en" sz="2724" dirty="0">
                 <a:solidFill>
                   <a:schemeClr val="dk1"/>
                 </a:solidFill>
@@ -9770,7 +9768,7 @@
               </a:rPr>
               <a:t>Attributes used for method:</a:t>
             </a:r>
-            <a:endParaRPr sz="2724">
+            <a:endParaRPr sz="2724" dirty="0">
               <a:solidFill>
                 <a:schemeClr val="dk1"/>
               </a:solidFill>
@@ -9796,7 +9794,7 @@
               <a:buChar char="○"/>
             </a:pPr>
             <a:r>
-              <a:rPr lang="en" sz="2724">
+              <a:rPr lang="en" sz="2724" dirty="0">
                 <a:solidFill>
                   <a:schemeClr val="dk1"/>
                 </a:solidFill>
@@ -9807,7 +9805,7 @@
               </a:rPr>
               <a:t>ARREST_BORO</a:t>
             </a:r>
-            <a:endParaRPr sz="2724">
+            <a:endParaRPr sz="2724" dirty="0">
               <a:solidFill>
                 <a:schemeClr val="dk1"/>
               </a:solidFill>
@@ -9833,7 +9831,7 @@
               <a:buChar char="○"/>
             </a:pPr>
             <a:r>
-              <a:rPr lang="en" sz="2724">
+              <a:rPr lang="en" sz="2724" dirty="0">
                 <a:solidFill>
                   <a:schemeClr val="dk1"/>
                 </a:solidFill>
@@ -9844,7 +9842,7 @@
               </a:rPr>
               <a:t>LAW_CAT_CD</a:t>
             </a:r>
-            <a:endParaRPr sz="2724">
+            <a:endParaRPr sz="2724" dirty="0">
               <a:solidFill>
                 <a:schemeClr val="dk1"/>
               </a:solidFill>
@@ -9870,7 +9868,7 @@
               <a:buChar char="○"/>
             </a:pPr>
             <a:r>
-              <a:rPr lang="en" sz="2724">
+              <a:rPr lang="en" sz="2724" dirty="0">
                 <a:solidFill>
                   <a:schemeClr val="dk1"/>
                 </a:solidFill>
@@ -9881,7 +9879,7 @@
               </a:rPr>
               <a:t>AGE_GROUP</a:t>
             </a:r>
-            <a:endParaRPr sz="2724">
+            <a:endParaRPr sz="2724" dirty="0">
               <a:solidFill>
                 <a:schemeClr val="dk1"/>
               </a:solidFill>
@@ -9907,7 +9905,7 @@
               <a:buChar char="○"/>
             </a:pPr>
             <a:r>
-              <a:rPr lang="en" sz="2724">
+              <a:rPr lang="en" sz="2724" dirty="0">
                 <a:solidFill>
                   <a:schemeClr val="dk1"/>
                 </a:solidFill>
@@ -9918,7 +9916,7 @@
               </a:rPr>
               <a:t>ARREST_DATE</a:t>
             </a:r>
-            <a:endParaRPr sz="2724">
+            <a:endParaRPr sz="2724" dirty="0">
               <a:solidFill>
                 <a:schemeClr val="dk1"/>
               </a:solidFill>
@@ -9938,7 +9936,7 @@
               </a:spcAft>
               <a:buNone/>
             </a:pPr>
-            <a:endParaRPr/>
+            <a:endParaRPr dirty="0"/>
           </a:p>
         </p:txBody>
       </p:sp>

</xml_diff>